<commit_message>
homepage updated. screen-shot pic updated
</commit_message>
<xml_diff>
--- a/S3-02-Dev/KenBrowser/promotion/KenBrowser-banner.pptx
+++ b/S3-02-Dev/KenBrowser/promotion/KenBrowser-banner.pptx
@@ -6,8 +6,7 @@
   </p:sldMasterIdLst>
   <p:sldIdLst>
     <p:sldId id="265" r:id="rId2"/>
-    <p:sldId id="266" r:id="rId3"/>
-    <p:sldId id="264" r:id="rId4"/>
+    <p:sldId id="267" r:id="rId3"/>
   </p:sldIdLst>
   <p:sldSz cx="11058525" cy="5400675"/>
   <p:notesSz cx="6858000" cy="9144000"/>
@@ -1650,7 +1649,7 @@
           <a:p>
             <a:fld id="{83F12504-7637-4DB2-B2FE-6E52528CC067}" type="datetimeFigureOut">
               <a:rPr lang="zh-CN" altLang="en-US" smtClean="0"/>
-              <a:t>2024/1/31</a:t>
+              <a:t>2024/2/6</a:t>
             </a:fld>
             <a:endParaRPr lang="zh-CN" altLang="en-US"/>
           </a:p>
@@ -1820,7 +1819,7 @@
           <a:p>
             <a:fld id="{83F12504-7637-4DB2-B2FE-6E52528CC067}" type="datetimeFigureOut">
               <a:rPr lang="zh-CN" altLang="en-US" smtClean="0"/>
-              <a:t>2024/1/31</a:t>
+              <a:t>2024/2/6</a:t>
             </a:fld>
             <a:endParaRPr lang="zh-CN" altLang="en-US"/>
           </a:p>
@@ -2000,7 +1999,7 @@
           <a:p>
             <a:fld id="{83F12504-7637-4DB2-B2FE-6E52528CC067}" type="datetimeFigureOut">
               <a:rPr lang="zh-CN" altLang="en-US" smtClean="0"/>
-              <a:t>2024/1/31</a:t>
+              <a:t>2024/2/6</a:t>
             </a:fld>
             <a:endParaRPr lang="zh-CN" altLang="en-US"/>
           </a:p>
@@ -2170,7 +2169,7 @@
           <a:p>
             <a:fld id="{83F12504-7637-4DB2-B2FE-6E52528CC067}" type="datetimeFigureOut">
               <a:rPr lang="zh-CN" altLang="en-US" smtClean="0"/>
-              <a:t>2024/1/31</a:t>
+              <a:t>2024/2/6</a:t>
             </a:fld>
             <a:endParaRPr lang="zh-CN" altLang="en-US"/>
           </a:p>
@@ -2421,7 +2420,7 @@
           <a:p>
             <a:fld id="{83F12504-7637-4DB2-B2FE-6E52528CC067}" type="datetimeFigureOut">
               <a:rPr lang="zh-CN" altLang="en-US" smtClean="0"/>
-              <a:t>2024/1/31</a:t>
+              <a:t>2024/2/6</a:t>
             </a:fld>
             <a:endParaRPr lang="zh-CN" altLang="en-US"/>
           </a:p>
@@ -2653,7 +2652,7 @@
           <a:p>
             <a:fld id="{83F12504-7637-4DB2-B2FE-6E52528CC067}" type="datetimeFigureOut">
               <a:rPr lang="zh-CN" altLang="en-US" smtClean="0"/>
-              <a:t>2024/1/31</a:t>
+              <a:t>2024/2/6</a:t>
             </a:fld>
             <a:endParaRPr lang="zh-CN" altLang="en-US"/>
           </a:p>
@@ -3000,7 +2999,7 @@
           <a:p>
             <a:fld id="{83F12504-7637-4DB2-B2FE-6E52528CC067}" type="datetimeFigureOut">
               <a:rPr lang="zh-CN" altLang="en-US" smtClean="0"/>
-              <a:t>2024/1/31</a:t>
+              <a:t>2024/2/6</a:t>
             </a:fld>
             <a:endParaRPr lang="zh-CN" altLang="en-US"/>
           </a:p>
@@ -3118,7 +3117,7 @@
           <a:p>
             <a:fld id="{83F12504-7637-4DB2-B2FE-6E52528CC067}" type="datetimeFigureOut">
               <a:rPr lang="zh-CN" altLang="en-US" smtClean="0"/>
-              <a:t>2024/1/31</a:t>
+              <a:t>2024/2/6</a:t>
             </a:fld>
             <a:endParaRPr lang="zh-CN" altLang="en-US"/>
           </a:p>
@@ -3236,7 +3235,7 @@
           <a:p>
             <a:fld id="{83F12504-7637-4DB2-B2FE-6E52528CC067}" type="datetimeFigureOut">
               <a:rPr lang="zh-CN" altLang="en-US" smtClean="0"/>
-              <a:t>2024/1/31</a:t>
+              <a:t>2024/2/6</a:t>
             </a:fld>
             <a:endParaRPr lang="zh-CN" altLang="en-US"/>
           </a:p>
@@ -3520,7 +3519,7 @@
           <a:p>
             <a:fld id="{83F12504-7637-4DB2-B2FE-6E52528CC067}" type="datetimeFigureOut">
               <a:rPr lang="zh-CN" altLang="en-US" smtClean="0"/>
-              <a:t>2024/1/31</a:t>
+              <a:t>2024/2/6</a:t>
             </a:fld>
             <a:endParaRPr lang="zh-CN" altLang="en-US"/>
           </a:p>
@@ -3784,7 +3783,7 @@
           <a:p>
             <a:fld id="{83F12504-7637-4DB2-B2FE-6E52528CC067}" type="datetimeFigureOut">
               <a:rPr lang="zh-CN" altLang="en-US" smtClean="0"/>
-              <a:t>2024/1/31</a:t>
+              <a:t>2024/2/6</a:t>
             </a:fld>
             <a:endParaRPr lang="zh-CN" altLang="en-US"/>
           </a:p>
@@ -3998,7 +3997,7 @@
           <a:p>
             <a:fld id="{83F12504-7637-4DB2-B2FE-6E52528CC067}" type="datetimeFigureOut">
               <a:rPr lang="zh-CN" altLang="en-US" smtClean="0"/>
-              <a:t>2024/1/31</a:t>
+              <a:t>2024/2/6</a:t>
             </a:fld>
             <a:endParaRPr lang="zh-CN" altLang="en-US"/>
           </a:p>
@@ -4454,17 +4453,35 @@
         </p:blipFill>
         <p:spPr>
           <a:xfrm>
-            <a:off x="7940611" y="451167"/>
-            <a:ext cx="2076157" cy="4498340"/>
+            <a:off x="7006640" y="627049"/>
+            <a:ext cx="1964294" cy="4255970"/>
           </a:xfrm>
-          <a:prstGeom prst="rect">
-            <a:avLst/>
+          <a:prstGeom prst="roundRect">
+            <a:avLst>
+              <a:gd name="adj" fmla="val 4167"/>
+            </a:avLst>
           </a:prstGeom>
-          <a:ln>
+          <a:solidFill>
+            <a:srgbClr val="FFFFFF"/>
+          </a:solidFill>
+          <a:ln w="25400" cap="sq">
             <a:solidFill>
-              <a:schemeClr val="tx1"/>
+              <a:srgbClr val="292929"/>
             </a:solidFill>
+            <a:miter lim="800000"/>
           </a:ln>
+          <a:effectLst/>
+          <a:scene3d>
+            <a:camera prst="orthographicFront"/>
+            <a:lightRig rig="threePt" dir="t">
+              <a:rot lat="0" lon="0" rev="2700000"/>
+            </a:lightRig>
+          </a:scene3d>
+          <a:sp3d>
+            <a:contourClr>
+              <a:srgbClr val="C0C0C0"/>
+            </a:contourClr>
+          </a:sp3d>
         </p:spPr>
       </p:pic>
       <p:sp>
@@ -4481,8 +4498,8 @@
         </p:nvSpPr>
         <p:spPr>
           <a:xfrm>
-            <a:off x="873337" y="1187822"/>
-            <a:ext cx="6558822" cy="2708434"/>
+            <a:off x="2045853" y="1024209"/>
+            <a:ext cx="4960787" cy="3216265"/>
           </a:xfrm>
           <a:prstGeom prst="rect">
             <a:avLst/>
@@ -4496,28 +4513,52 @@
           <a:lstStyle/>
           <a:p>
             <a:r>
-              <a:rPr lang="en-US" altLang="zh-CN" sz="4000" dirty="0"/>
-              <a:t>KenBrowser</a:t>
+              <a:rPr lang="en-US" altLang="zh-CN" sz="4800" dirty="0"/>
+              <a:t>KenBrowser </a:t>
+            </a:r>
+          </a:p>
+          <a:p>
+            <a:r>
+              <a:rPr lang="en-US" altLang="zh-CN" sz="2300" dirty="0"/>
+              <a:t>a finger-friendly browser</a:t>
             </a:r>
           </a:p>
           <a:p>
             <a:endParaRPr lang="en-US" altLang="zh-CN" dirty="0"/>
           </a:p>
           <a:p>
-            <a:endParaRPr lang="en-US" altLang="zh-CN" sz="2800" dirty="0"/>
-          </a:p>
-          <a:p>
-            <a:r>
-              <a:rPr lang="en-US" altLang="zh-CN" sz="2800" dirty="0"/>
-              <a:t>A tiny and clean Android mobile browser,</a:t>
-            </a:r>
-          </a:p>
-          <a:p>
-            <a:r>
-              <a:rPr lang="en-US" altLang="zh-CN" sz="2800" dirty="0"/>
-              <a:t>Enables you to browser webpages with only one finger!</a:t>
-            </a:r>
-            <a:endParaRPr lang="zh-CN" altLang="en-US" sz="1400" dirty="0"/>
+            <a:endParaRPr lang="en-US" altLang="zh-CN" dirty="0"/>
+          </a:p>
+          <a:p>
+            <a:pPr marL="457200" indent="-457200">
+              <a:buFont typeface="Arial" panose="020B0604020202020204" pitchFamily="34" charset="0"/>
+              <a:buChar char="•"/>
+            </a:pPr>
+            <a:r>
+              <a:rPr lang="en-US" altLang="zh-CN" sz="2400" dirty="0"/>
+              <a:t>Tiny &amp; clean</a:t>
+            </a:r>
+          </a:p>
+          <a:p>
+            <a:pPr marL="457200" indent="-457200">
+              <a:buFont typeface="Arial" panose="020B0604020202020204" pitchFamily="34" charset="0"/>
+              <a:buChar char="•"/>
+            </a:pPr>
+            <a:r>
+              <a:rPr lang="en-US" altLang="zh-CN" sz="2400" dirty="0"/>
+              <a:t>Auto-scroll, hidden bookmark</a:t>
+            </a:r>
+          </a:p>
+          <a:p>
+            <a:pPr marL="457200" indent="-457200">
+              <a:buFont typeface="Arial" panose="020B0604020202020204" pitchFamily="34" charset="0"/>
+              <a:buChar char="•"/>
+            </a:pPr>
+            <a:r>
+              <a:rPr lang="en-US" altLang="zh-CN" sz="2400" dirty="0"/>
+              <a:t>Browse web with least finger movement</a:t>
+            </a:r>
+            <a:endParaRPr lang="zh-CN" altLang="en-US" sz="1200" dirty="0"/>
           </a:p>
         </p:txBody>
       </p:sp>
@@ -4573,7 +4614,13 @@
     </p:bg>
     <p:spTree>
       <p:nvGrpSpPr>
-        <p:cNvPr id="1" name=""/>
+        <p:cNvPr id="1" name="">
+          <a:extLst>
+            <a:ext uri="{FF2B5EF4-FFF2-40B4-BE49-F238E27FC236}">
+              <a16:creationId xmlns:a16="http://schemas.microsoft.com/office/drawing/2014/main" id="{E6AF3DA6-FFBC-8640-9B50-9BB3887E16A0}"/>
+            </a:ext>
+          </a:extLst>
+        </p:cNvPr>
         <p:cNvGrpSpPr/>
         <p:nvPr/>
       </p:nvGrpSpPr>
@@ -4590,7 +4637,7 @@
           <p:cNvPr id="4" name="图片 3">
             <a:extLst>
               <a:ext uri="{FF2B5EF4-FFF2-40B4-BE49-F238E27FC236}">
-                <a16:creationId xmlns:a16="http://schemas.microsoft.com/office/drawing/2014/main" id="{5AE7848F-4194-7151-4177-E243BE553464}"/>
+                <a16:creationId xmlns:a16="http://schemas.microsoft.com/office/drawing/2014/main" id="{D2F6ADD8-0242-3163-56B3-01BCF0DFD497}"/>
               </a:ext>
             </a:extLst>
           </p:cNvPr>
@@ -4613,17 +4660,35 @@
         </p:blipFill>
         <p:spPr>
           <a:xfrm>
-            <a:off x="7940611" y="451167"/>
-            <a:ext cx="2076157" cy="4498340"/>
+            <a:off x="7006640" y="627049"/>
+            <a:ext cx="1964294" cy="4255970"/>
           </a:xfrm>
-          <a:prstGeom prst="rect">
-            <a:avLst/>
+          <a:prstGeom prst="roundRect">
+            <a:avLst>
+              <a:gd name="adj" fmla="val 4167"/>
+            </a:avLst>
           </a:prstGeom>
-          <a:ln>
+          <a:solidFill>
+            <a:srgbClr val="FFFFFF"/>
+          </a:solidFill>
+          <a:ln w="25400" cap="sq">
             <a:solidFill>
-              <a:schemeClr val="tx1"/>
+              <a:srgbClr val="292929"/>
             </a:solidFill>
+            <a:miter lim="800000"/>
           </a:ln>
+          <a:effectLst/>
+          <a:scene3d>
+            <a:camera prst="orthographicFront"/>
+            <a:lightRig rig="threePt" dir="t">
+              <a:rot lat="0" lon="0" rev="2700000"/>
+            </a:lightRig>
+          </a:scene3d>
+          <a:sp3d>
+            <a:contourClr>
+              <a:srgbClr val="C0C0C0"/>
+            </a:contourClr>
+          </a:sp3d>
         </p:spPr>
       </p:pic>
       <p:sp>
@@ -4631,7 +4696,7 @@
           <p:cNvPr id="5" name="文本框 4">
             <a:extLst>
               <a:ext uri="{FF2B5EF4-FFF2-40B4-BE49-F238E27FC236}">
-                <a16:creationId xmlns:a16="http://schemas.microsoft.com/office/drawing/2014/main" id="{8B50FCEA-702D-27D5-9B2D-802DB913918F}"/>
+                <a16:creationId xmlns:a16="http://schemas.microsoft.com/office/drawing/2014/main" id="{934F8BC0-760B-087C-4A47-2051A1B62FE7}"/>
               </a:ext>
             </a:extLst>
           </p:cNvPr>
@@ -4640,8 +4705,8 @@
         </p:nvSpPr>
         <p:spPr>
           <a:xfrm>
-            <a:off x="580572" y="1007566"/>
-            <a:ext cx="7141028" cy="3447098"/>
+            <a:off x="2045853" y="1024209"/>
+            <a:ext cx="4960787" cy="2954655"/>
           </a:xfrm>
           <a:prstGeom prst="rect">
             <a:avLst/>
@@ -4655,23 +4720,55 @@
           <a:lstStyle/>
           <a:p>
             <a:r>
-              <a:rPr lang="en-US" altLang="zh-CN" sz="4400" dirty="0"/>
+              <a:rPr lang="en-US" altLang="zh-CN" sz="4800" dirty="0">
+                <a:latin typeface="微软雅黑" panose="020B0503020204020204" pitchFamily="34" charset="-122"/>
+                <a:ea typeface="微软雅黑" panose="020B0503020204020204" pitchFamily="34" charset="-122"/>
+              </a:rPr>
               <a:t>KB</a:t>
             </a:r>
             <a:r>
-              <a:rPr lang="zh-CN" altLang="en-US" sz="4400" dirty="0"/>
-              <a:t>浏览器 </a:t>
-            </a:r>
-            <a:r>
-              <a:rPr lang="en-US" altLang="zh-CN" sz="4400" dirty="0"/>
-              <a:t>(KenBrowser)</a:t>
-            </a:r>
+              <a:rPr lang="zh-CN" altLang="en-US" sz="4800" dirty="0">
+                <a:latin typeface="微软雅黑" panose="020B0503020204020204" pitchFamily="34" charset="-122"/>
+                <a:ea typeface="微软雅黑" panose="020B0503020204020204" pitchFamily="34" charset="-122"/>
+              </a:rPr>
+              <a:t>浏览器</a:t>
+            </a:r>
+            <a:r>
+              <a:rPr lang="en-US" altLang="zh-CN" sz="4800" dirty="0">
+                <a:latin typeface="微软雅黑" panose="020B0503020204020204" pitchFamily="34" charset="-122"/>
+                <a:ea typeface="微软雅黑" panose="020B0503020204020204" pitchFamily="34" charset="-122"/>
+              </a:rPr>
+              <a:t> </a:t>
+            </a:r>
+          </a:p>
+          <a:p>
+            <a:endParaRPr lang="en-US" altLang="zh-CN" sz="600" dirty="0">
+              <a:latin typeface="微软雅黑" panose="020B0503020204020204" pitchFamily="34" charset="-122"/>
+              <a:ea typeface="微软雅黑" panose="020B0503020204020204" pitchFamily="34" charset="-122"/>
+            </a:endParaRPr>
+          </a:p>
+          <a:p>
+            <a:r>
+              <a:rPr lang="en-US" altLang="zh-CN" sz="2400" dirty="0">
+                <a:latin typeface="+mn-ea"/>
+              </a:rPr>
+              <a:t>-- </a:t>
+            </a:r>
+            <a:r>
+              <a:rPr lang="zh-CN" altLang="en-US" sz="2400" dirty="0">
+                <a:latin typeface="+mn-ea"/>
+              </a:rPr>
+              <a:t>你手指头最喜欢的浏览器</a:t>
+            </a:r>
+            <a:endParaRPr lang="en-US" altLang="zh-CN" sz="2400" dirty="0">
+              <a:latin typeface="+mn-ea"/>
+            </a:endParaRPr>
           </a:p>
           <a:p>
             <a:endParaRPr lang="en-US" altLang="zh-CN" dirty="0"/>
           </a:p>
           <a:p>
-            <a:endParaRPr lang="en-US" altLang="zh-CN" sz="2800" dirty="0"/>
+            <a:endParaRPr lang="en-US" altLang="zh-CN" dirty="0"/>
           </a:p>
           <a:p>
             <a:pPr marL="457200" indent="-457200">
@@ -4679,13 +4776,10 @@
               <a:buChar char="•"/>
             </a:pPr>
             <a:r>
-              <a:rPr lang="zh-CN" altLang="en-US" sz="3200" dirty="0"/>
-              <a:t>轻便小巧，只有</a:t>
-            </a:r>
-            <a:r>
-              <a:rPr lang="en-US" altLang="zh-CN" sz="3200" dirty="0"/>
-              <a:t>4m</a:t>
-            </a:r>
+              <a:rPr lang="zh-CN" altLang="en-US" sz="2400" dirty="0"/>
+              <a:t>干净小巧</a:t>
+            </a:r>
+            <a:endParaRPr lang="en-US" altLang="zh-CN" sz="2400" dirty="0"/>
           </a:p>
           <a:p>
             <a:pPr marL="457200" indent="-457200">
@@ -4693,10 +4787,10 @@
               <a:buChar char="•"/>
             </a:pPr>
             <a:r>
-              <a:rPr lang="zh-CN" altLang="en-US" sz="3200" dirty="0"/>
-              <a:t>网页自动滚动，一键上下左右翻页</a:t>
-            </a:r>
-            <a:endParaRPr lang="en-US" altLang="zh-CN" sz="3200" dirty="0"/>
+              <a:rPr lang="zh-CN" altLang="en-US" sz="2400" dirty="0"/>
+              <a:t>自动滚动，隐藏书签</a:t>
+            </a:r>
+            <a:endParaRPr lang="en-US" altLang="zh-CN" sz="2400" dirty="0"/>
           </a:p>
           <a:p>
             <a:pPr marL="457200" indent="-457200">
@@ -4704,300 +4798,17 @@
               <a:buChar char="•"/>
             </a:pPr>
             <a:r>
-              <a:rPr lang="zh-CN" altLang="en-US" sz="3200" dirty="0"/>
-              <a:t>隐藏私人书签</a:t>
-            </a:r>
-            <a:endParaRPr lang="en-US" altLang="zh-CN" sz="3200" dirty="0"/>
-          </a:p>
-          <a:p>
-            <a:pPr marL="457200" indent="-457200">
-              <a:buFont typeface="Arial" panose="020B0604020202020204" pitchFamily="34" charset="0"/>
-              <a:buChar char="•"/>
-            </a:pPr>
-            <a:r>
-              <a:rPr lang="zh-CN" altLang="en-US" sz="3200" dirty="0"/>
-              <a:t>支持内嵌油猴脚本</a:t>
-            </a:r>
-            <a:endParaRPr lang="en-US" altLang="zh-CN" sz="3200" dirty="0"/>
+              <a:rPr lang="zh-CN" altLang="en-US" sz="2400" dirty="0"/>
+              <a:t>用最少的手指移动浏览网页</a:t>
+            </a:r>
+            <a:endParaRPr lang="en-US" altLang="zh-CN" sz="2400" dirty="0"/>
           </a:p>
         </p:txBody>
       </p:sp>
     </p:spTree>
     <p:extLst>
       <p:ext uri="{BB962C8B-B14F-4D97-AF65-F5344CB8AC3E}">
-        <p14:creationId xmlns:p14="http://schemas.microsoft.com/office/powerpoint/2010/main" val="938729212"/>
-      </p:ext>
-    </p:extLst>
-  </p:cSld>
-  <p:clrMapOvr>
-    <a:masterClrMapping/>
-  </p:clrMapOvr>
-</p:sld>
-</file>
-
-<file path=ppt/slides/slide3.xml><?xml version="1.0" encoding="utf-8"?>
-<p:sld xmlns:a="http://schemas.openxmlformats.org/drawingml/2006/main" xmlns:r="http://schemas.openxmlformats.org/officeDocument/2006/relationships" xmlns:p="http://schemas.openxmlformats.org/presentationml/2006/main">
-  <p:cSld>
-    <p:spTree>
-      <p:nvGrpSpPr>
-        <p:cNvPr id="1" name=""/>
-        <p:cNvGrpSpPr/>
-        <p:nvPr/>
-      </p:nvGrpSpPr>
-      <p:grpSpPr>
-        <a:xfrm>
-          <a:off x="0" y="0"/>
-          <a:ext cx="0" cy="0"/>
-          <a:chOff x="0" y="0"/>
-          <a:chExt cx="0" cy="0"/>
-        </a:xfrm>
-      </p:grpSpPr>
-      <p:pic>
-        <p:nvPicPr>
-          <p:cNvPr id="7" name="图片 6">
-            <a:extLst>
-              <a:ext uri="{FF2B5EF4-FFF2-40B4-BE49-F238E27FC236}">
-                <a16:creationId xmlns:a16="http://schemas.microsoft.com/office/drawing/2014/main" id="{58E881D2-FD00-B7D2-43FC-B2C0C1FCE627}"/>
-              </a:ext>
-            </a:extLst>
-          </p:cNvPr>
-          <p:cNvPicPr>
-            <a:picLocks noChangeAspect="1"/>
-          </p:cNvPicPr>
-          <p:nvPr/>
-        </p:nvPicPr>
-        <p:blipFill>
-          <a:blip r:embed="rId2">
-            <a:extLst>
-              <a:ext uri="{28A0092B-C50C-407E-A947-70E740481C1C}">
-                <a14:useLocalDpi xmlns:a14="http://schemas.microsoft.com/office/drawing/2010/main" val="0"/>
-              </a:ext>
-            </a:extLst>
-          </a:blip>
-          <a:stretch>
-            <a:fillRect/>
-          </a:stretch>
-        </p:blipFill>
-        <p:spPr>
-          <a:xfrm>
-            <a:off x="1929680" y="1598679"/>
-            <a:ext cx="1646063" cy="1646063"/>
-          </a:xfrm>
-          <a:prstGeom prst="rect">
-            <a:avLst/>
-          </a:prstGeom>
-        </p:spPr>
-      </p:pic>
-      <p:sp>
-        <p:nvSpPr>
-          <p:cNvPr id="8" name="椭圆 7">
-            <a:extLst>
-              <a:ext uri="{FF2B5EF4-FFF2-40B4-BE49-F238E27FC236}">
-                <a16:creationId xmlns:a16="http://schemas.microsoft.com/office/drawing/2014/main" id="{B41D24F6-D69D-4244-8908-26047E1B8BDC}"/>
-              </a:ext>
-            </a:extLst>
-          </p:cNvPr>
-          <p:cNvSpPr/>
-          <p:nvPr/>
-        </p:nvSpPr>
-        <p:spPr>
-          <a:xfrm rot="20933057">
-            <a:off x="2038104" y="2033406"/>
-            <a:ext cx="1357315" cy="287114"/>
-          </a:xfrm>
-          <a:prstGeom prst="ellipse">
-            <a:avLst/>
-          </a:prstGeom>
-          <a:noFill/>
-          <a:ln w="28575">
-            <a:solidFill>
-              <a:srgbClr val="DBDBDB"/>
-            </a:solidFill>
-            <a:prstDash val="solid"/>
-          </a:ln>
-        </p:spPr>
-        <p:style>
-          <a:lnRef idx="2">
-            <a:schemeClr val="accent1">
-              <a:shade val="15000"/>
-            </a:schemeClr>
-          </a:lnRef>
-          <a:fillRef idx="1">
-            <a:schemeClr val="accent1"/>
-          </a:fillRef>
-          <a:effectRef idx="0">
-            <a:schemeClr val="accent1"/>
-          </a:effectRef>
-          <a:fontRef idx="minor">
-            <a:schemeClr val="lt1"/>
-          </a:fontRef>
-        </p:style>
-        <p:txBody>
-          <a:bodyPr rtlCol="0" anchor="ctr"/>
-          <a:lstStyle/>
-          <a:p>
-            <a:pPr algn="ctr"/>
-            <a:endParaRPr lang="zh-CN" altLang="en-US"/>
-          </a:p>
-        </p:txBody>
-      </p:sp>
-      <p:sp>
-        <p:nvSpPr>
-          <p:cNvPr id="10" name="椭圆 9">
-            <a:extLst>
-              <a:ext uri="{FF2B5EF4-FFF2-40B4-BE49-F238E27FC236}">
-                <a16:creationId xmlns:a16="http://schemas.microsoft.com/office/drawing/2014/main" id="{4A5D2818-5F68-E19F-9C3C-7F150EC4AAA7}"/>
-              </a:ext>
-            </a:extLst>
-          </p:cNvPr>
-          <p:cNvSpPr/>
-          <p:nvPr/>
-        </p:nvSpPr>
-        <p:spPr>
-          <a:xfrm>
-            <a:off x="3326445" y="1984058"/>
-            <a:ext cx="113032" cy="103559"/>
-          </a:xfrm>
-          <a:prstGeom prst="ellipse">
-            <a:avLst/>
-          </a:prstGeom>
-          <a:solidFill>
-            <a:srgbClr val="DBDBDB"/>
-          </a:solidFill>
-          <a:ln>
-            <a:noFill/>
-          </a:ln>
-        </p:spPr>
-        <p:style>
-          <a:lnRef idx="2">
-            <a:schemeClr val="accent1">
-              <a:shade val="15000"/>
-            </a:schemeClr>
-          </a:lnRef>
-          <a:fillRef idx="1">
-            <a:schemeClr val="accent1"/>
-          </a:fillRef>
-          <a:effectRef idx="0">
-            <a:schemeClr val="accent1"/>
-          </a:effectRef>
-          <a:fontRef idx="minor">
-            <a:schemeClr val="lt1"/>
-          </a:fontRef>
-        </p:style>
-        <p:txBody>
-          <a:bodyPr rtlCol="0" anchor="ctr"/>
-          <a:lstStyle/>
-          <a:p>
-            <a:pPr algn="ctr"/>
-            <a:endParaRPr lang="zh-CN" altLang="en-US"/>
-          </a:p>
-        </p:txBody>
-      </p:sp>
-      <p:sp>
-        <p:nvSpPr>
-          <p:cNvPr id="11" name="矩形 10">
-            <a:extLst>
-              <a:ext uri="{FF2B5EF4-FFF2-40B4-BE49-F238E27FC236}">
-                <a16:creationId xmlns:a16="http://schemas.microsoft.com/office/drawing/2014/main" id="{1142A05E-50C7-F7A4-96BF-D1B2515D4303}"/>
-              </a:ext>
-            </a:extLst>
-          </p:cNvPr>
-          <p:cNvSpPr/>
-          <p:nvPr/>
-        </p:nvSpPr>
-        <p:spPr>
-          <a:xfrm>
-            <a:off x="2228278" y="2586037"/>
-            <a:ext cx="979170" cy="422910"/>
-          </a:xfrm>
-          <a:prstGeom prst="rect">
-            <a:avLst/>
-          </a:prstGeom>
-          <a:solidFill>
-            <a:srgbClr val="018786"/>
-          </a:solidFill>
-          <a:ln>
-            <a:noFill/>
-          </a:ln>
-        </p:spPr>
-        <p:style>
-          <a:lnRef idx="2">
-            <a:schemeClr val="accent1">
-              <a:shade val="15000"/>
-            </a:schemeClr>
-          </a:lnRef>
-          <a:fillRef idx="1">
-            <a:schemeClr val="accent1"/>
-          </a:fillRef>
-          <a:effectRef idx="0">
-            <a:schemeClr val="accent1"/>
-          </a:effectRef>
-          <a:fontRef idx="minor">
-            <a:schemeClr val="lt1"/>
-          </a:fontRef>
-        </p:style>
-        <p:txBody>
-          <a:bodyPr rtlCol="0" anchor="ctr"/>
-          <a:lstStyle/>
-          <a:p>
-            <a:pPr algn="ctr"/>
-            <a:endParaRPr lang="zh-CN" altLang="en-US"/>
-          </a:p>
-        </p:txBody>
-      </p:sp>
-      <p:sp>
-        <p:nvSpPr>
-          <p:cNvPr id="9" name="矩形 8">
-            <a:extLst>
-              <a:ext uri="{FF2B5EF4-FFF2-40B4-BE49-F238E27FC236}">
-                <a16:creationId xmlns:a16="http://schemas.microsoft.com/office/drawing/2014/main" id="{5E97EBC7-EAC0-0009-2CB0-CFDE8A8C93FD}"/>
-              </a:ext>
-            </a:extLst>
-          </p:cNvPr>
-          <p:cNvSpPr/>
-          <p:nvPr/>
-        </p:nvSpPr>
-        <p:spPr>
-          <a:xfrm>
-            <a:off x="2011085" y="2421710"/>
-            <a:ext cx="1297571" cy="830997"/>
-          </a:xfrm>
-          <a:prstGeom prst="rect">
-            <a:avLst/>
-          </a:prstGeom>
-          <a:noFill/>
-        </p:spPr>
-        <p:txBody>
-          <a:bodyPr wrap="square" lIns="91440" tIns="45720" rIns="91440" bIns="45720">
-            <a:spAutoFit/>
-          </a:bodyPr>
-          <a:lstStyle/>
-          <a:p>
-            <a:pPr algn="ctr"/>
-            <a:r>
-              <a:rPr lang="en-US" altLang="zh-CN" sz="4800" i="1" dirty="0">
-                <a:ln w="0"/>
-                <a:solidFill>
-                  <a:srgbClr val="DBDBDB"/>
-                </a:solidFill>
-                <a:latin typeface="Arial Black" panose="020B0A04020102020204" pitchFamily="34" charset="0"/>
-              </a:rPr>
-              <a:t>KB</a:t>
-            </a:r>
-            <a:endParaRPr lang="zh-CN" altLang="en-US" sz="4800" i="1" dirty="0">
-              <a:ln w="0"/>
-              <a:solidFill>
-                <a:srgbClr val="DBDBDB"/>
-              </a:solidFill>
-              <a:latin typeface="Arial Black" panose="020B0A04020102020204" pitchFamily="34" charset="0"/>
-            </a:endParaRPr>
-          </a:p>
-        </p:txBody>
-      </p:sp>
-    </p:spTree>
-    <p:extLst>
-      <p:ext uri="{BB962C8B-B14F-4D97-AF65-F5344CB8AC3E}">
-        <p14:creationId xmlns:p14="http://schemas.microsoft.com/office/powerpoint/2010/main" val="2443724687"/>
+        <p14:creationId xmlns:p14="http://schemas.microsoft.com/office/powerpoint/2010/main" val="3999935747"/>
       </p:ext>
     </p:extLst>
   </p:cSld>

</xml_diff>